<commit_message>
Some more presentation updates.
</commit_message>
<xml_diff>
--- a/presentation/CloudComputingConfigurationManagement.pptx
+++ b/presentation/CloudComputingConfigurationManagement.pptx
@@ -46,7 +46,9 @@
     <p:sldId id="299" r:id="rId40"/>
     <p:sldId id="295" r:id="rId41"/>
     <p:sldId id="296" r:id="rId42"/>
-    <p:sldId id="272" r:id="rId43"/>
+    <p:sldId id="303" r:id="rId43"/>
+    <p:sldId id="302" r:id="rId44"/>
+    <p:sldId id="272" r:id="rId45"/>
   </p:sldIdLst>
   <p:sldSz cx="9144000" cy="6858000" type="screen4x3"/>
   <p:notesSz cx="6858000" cy="9144000"/>
@@ -3169,9 +3171,16 @@
             <p:ph type="subTitle" idx="1"/>
           </p:nvPr>
         </p:nvSpPr>
-        <p:spPr/>
-        <p:txBody>
-          <a:bodyPr/>
+        <p:spPr>
+          <a:xfrm>
+            <a:off x="317487" y="3886200"/>
+            <a:ext cx="8514437" cy="2448702"/>
+          </a:xfrm>
+        </p:spPr>
+        <p:txBody>
+          <a:bodyPr>
+            <a:normAutofit/>
+          </a:bodyPr>
           <a:lstStyle/>
           <a:p>
             <a:r>
@@ -3187,6 +3196,27 @@
             <a:r>
               <a:rPr lang="en-US" dirty="0" smtClean="0"/>
               <a:t> Engineer, CradlePoint</a:t>
+            </a:r>
+          </a:p>
+          <a:p>
+            <a:endParaRPr lang="en-US" dirty="0" smtClean="0"/>
+          </a:p>
+          <a:p>
+            <a:r>
+              <a:rPr lang="en-US" dirty="0">
+                <a:hlinkClick r:id="rId2"/>
+              </a:rPr>
+              <a:t>https://github.com/zvickery/bsu-cloud-</a:t>
+            </a:r>
+            <a:r>
+              <a:rPr lang="en-US" dirty="0" smtClean="0">
+                <a:hlinkClick r:id="rId2"/>
+              </a:rPr>
+              <a:t>computing</a:t>
+            </a:r>
+            <a:r>
+              <a:rPr lang="en-US" dirty="0" smtClean="0"/>
+              <a:t> </a:t>
             </a:r>
             <a:endParaRPr lang="en-US" dirty="0"/>
           </a:p>
@@ -3538,7 +3568,12 @@
             <p:ph type="title"/>
           </p:nvPr>
         </p:nvSpPr>
-        <p:spPr/>
+        <p:spPr>
+          <a:xfrm>
+            <a:off x="457200" y="274638"/>
+            <a:ext cx="8229600" cy="879786"/>
+          </a:xfrm>
+        </p:spPr>
         <p:txBody>
           <a:bodyPr/>
           <a:lstStyle/>
@@ -3561,7 +3596,12 @@
             <p:ph idx="1"/>
           </p:nvPr>
         </p:nvSpPr>
-        <p:spPr/>
+        <p:spPr>
+          <a:xfrm>
+            <a:off x="457200" y="1313157"/>
+            <a:ext cx="8229600" cy="5324781"/>
+          </a:xfrm>
+        </p:spPr>
         <p:txBody>
           <a:bodyPr>
             <a:normAutofit fontScale="92500" lnSpcReduction="20000"/>
@@ -3570,11 +3610,19 @@
           <a:p>
             <a:r>
               <a:rPr lang="en-US" dirty="0"/>
-              <a:t>Roles represent a node’s personality (e.g. web server) and </a:t>
-            </a:r>
-            <a:r>
-              <a:rPr lang="en-US" dirty="0" smtClean="0"/>
-              <a:t>typically have a “run list” of cookbooks/recipes associated</a:t>
+              <a:t>Roles represent a node’s personality </a:t>
+            </a:r>
+            <a:r>
+              <a:rPr lang="en-US" dirty="0" smtClean="0"/>
+              <a:t>(what it does) </a:t>
+            </a:r>
+            <a:r>
+              <a:rPr lang="en-US" dirty="0"/>
+              <a:t>and </a:t>
+            </a:r>
+            <a:r>
+              <a:rPr lang="en-US" dirty="0" smtClean="0"/>
+              <a:t>typically have a “run list” of cookbooks/recipes associated (how it does it)</a:t>
             </a:r>
             <a:endParaRPr lang="en-US" dirty="0"/>
           </a:p>
@@ -3582,6 +3630,12 @@
             <a:r>
               <a:rPr lang="en-US" dirty="0" smtClean="0"/>
               <a:t>Environments represent a collection of roles that can be configured as one (e.g. production, test, etc.)</a:t>
+            </a:r>
+          </a:p>
+          <a:p>
+            <a:r>
+              <a:rPr lang="en-US" dirty="0" smtClean="0"/>
+              <a:t>Organizations are top-level concepts for everything including users</a:t>
             </a:r>
           </a:p>
           <a:p>
@@ -3836,11 +3890,7 @@
             <a:pPr lvl="1"/>
             <a:r>
               <a:rPr lang="en-US" dirty="0" smtClean="0"/>
-              <a:t>Uses vagrant to setup a local VM to actually run your cookbook and to test the configuration of a deployed </a:t>
-            </a:r>
-            <a:r>
-              <a:rPr lang="en-US" dirty="0" smtClean="0"/>
-              <a:t>system.  </a:t>
+              <a:t>Uses vagrant to setup a local VM to actually run your cookbook and to test the configuration of a deployed system.  </a:t>
             </a:r>
             <a:r>
               <a:rPr lang="en-US" dirty="0" err="1" smtClean="0"/>
@@ -3858,7 +3908,6 @@
               <a:rPr lang="en-US" dirty="0" smtClean="0"/>
               <a:t> provides assertion framework.</a:t>
             </a:r>
-            <a:endParaRPr lang="en-US" dirty="0" smtClean="0"/>
           </a:p>
           <a:p>
             <a:r>
@@ -4268,40 +4317,58 @@
             <p:ph type="title"/>
           </p:nvPr>
         </p:nvSpPr>
-        <p:spPr/>
-        <p:txBody>
-          <a:bodyPr/>
-          <a:lstStyle/>
-          <a:p>
-            <a:r>
-              <a:rPr lang="en-US" dirty="0" smtClean="0"/>
-              <a:t>Chef Operating Model</a:t>
-            </a:r>
-            <a:endParaRPr lang="en-US" dirty="0"/>
-          </a:p>
-        </p:txBody>
-      </p:sp>
-      <p:sp>
-        <p:nvSpPr>
-          <p:cNvPr id="3" name="Content Placeholder 2"/>
-          <p:cNvSpPr>
-            <a:spLocks noGrp="1"/>
-          </p:cNvSpPr>
-          <p:nvPr>
-            <p:ph idx="1"/>
-          </p:nvPr>
-        </p:nvSpPr>
         <p:spPr>
           <a:xfrm>
-            <a:off x="457200" y="1600200"/>
-            <a:ext cx="8229600" cy="4980017"/>
+            <a:off x="457200" y="274638"/>
+            <a:ext cx="8229600" cy="793204"/>
           </a:xfrm>
         </p:spPr>
         <p:txBody>
+          <a:bodyPr/>
+          <a:lstStyle/>
+          <a:p>
+            <a:r>
+              <a:rPr lang="en-US" dirty="0" smtClean="0"/>
+              <a:t>Chef Operating Model</a:t>
+            </a:r>
+            <a:endParaRPr lang="en-US" dirty="0"/>
+          </a:p>
+        </p:txBody>
+      </p:sp>
+      <p:sp>
+        <p:nvSpPr>
+          <p:cNvPr id="3" name="Content Placeholder 2"/>
+          <p:cNvSpPr>
+            <a:spLocks noGrp="1"/>
+          </p:cNvSpPr>
+          <p:nvPr>
+            <p:ph idx="1"/>
+          </p:nvPr>
+        </p:nvSpPr>
+        <p:spPr>
+          <a:xfrm>
+            <a:off x="457200" y="1327588"/>
+            <a:ext cx="8229600" cy="5252629"/>
+          </a:xfrm>
+        </p:spPr>
+        <p:txBody>
           <a:bodyPr>
-            <a:normAutofit fontScale="92500" lnSpcReduction="10000"/>
+            <a:normAutofit fontScale="92500" lnSpcReduction="20000"/>
           </a:bodyPr>
           <a:lstStyle/>
+          <a:p>
+            <a:r>
+              <a:rPr lang="en-US" dirty="0" smtClean="0"/>
+              <a:t>Chef-zero</a:t>
+            </a:r>
+          </a:p>
+          <a:p>
+            <a:pPr lvl="1"/>
+            <a:r>
+              <a:rPr lang="en-US" dirty="0" smtClean="0"/>
+              <a:t>An emulator used for unit testing and the like</a:t>
+            </a:r>
+          </a:p>
           <a:p>
             <a:r>
               <a:rPr lang="en-US" dirty="0" smtClean="0"/>
@@ -4986,30 +5053,22 @@
             <a:pPr lvl="1"/>
             <a:r>
               <a:rPr lang="en-US" dirty="0" smtClean="0"/>
-              <a:t>Store global data items</a:t>
-            </a:r>
-          </a:p>
-          <a:p>
-            <a:pPr lvl="1"/>
-            <a:r>
-              <a:rPr lang="en-US" dirty="0" smtClean="0"/>
-              <a:t>Can be encrypted to manage passwords, certificates, etc.</a:t>
-            </a:r>
-          </a:p>
-          <a:p>
-            <a:r>
-              <a:rPr lang="en-US" dirty="0" smtClean="0">
-                <a:solidFill>
-                  <a:srgbClr val="FF0000"/>
-                </a:solidFill>
-              </a:rPr>
-              <a:t>Demo</a:t>
-            </a:r>
-            <a:endParaRPr lang="en-US" dirty="0">
-              <a:solidFill>
-                <a:srgbClr val="FF0000"/>
-              </a:solidFill>
-            </a:endParaRPr>
+              <a:t>Basically just a JSON file which can be referenced by recipes</a:t>
+            </a:r>
+          </a:p>
+          <a:p>
+            <a:pPr lvl="1"/>
+            <a:r>
+              <a:rPr lang="en-US" dirty="0" smtClean="0"/>
+              <a:t>Store global data items of a static nature</a:t>
+            </a:r>
+          </a:p>
+          <a:p>
+            <a:pPr lvl="1"/>
+            <a:r>
+              <a:rPr lang="en-US" dirty="0" smtClean="0"/>
+              <a:t>Can be encrypted to manage passwords, certificates, API keys, etc.</a:t>
+            </a:r>
           </a:p>
         </p:txBody>
       </p:sp>
@@ -6076,6 +6135,22 @@
           <a:bodyPr/>
           <a:lstStyle/>
           <a:p>
+            <a:r>
+              <a:rPr lang="en-US" dirty="0" smtClean="0"/>
+              <a:t>Build a cloud server</a:t>
+            </a:r>
+          </a:p>
+          <a:p>
+            <a:r>
+              <a:rPr lang="en-US" dirty="0" smtClean="0"/>
+              <a:t>Provision it</a:t>
+            </a:r>
+          </a:p>
+          <a:p>
+            <a:r>
+              <a:rPr lang="en-US" dirty="0" smtClean="0"/>
+              <a:t>Take an image of it</a:t>
+            </a:r>
             <a:endParaRPr lang="en-US" dirty="0"/>
           </a:p>
         </p:txBody>
@@ -6332,7 +6407,7 @@
             <a:pPr lvl="1"/>
             <a:r>
               <a:rPr lang="en-US" dirty="0" smtClean="0"/>
-              <a:t>Can use cloud-</a:t>
+              <a:t>Can use user data/cloud-</a:t>
             </a:r>
             <a:r>
               <a:rPr lang="en-US" dirty="0" err="1" smtClean="0"/>
@@ -6645,7 +6720,7 @@
           <a:p>
             <a:r>
               <a:rPr lang="en-US" dirty="0" smtClean="0"/>
-              <a:t>Application Update</a:t>
+              <a:t>Application Updates</a:t>
             </a:r>
             <a:endParaRPr lang="en-US" dirty="0"/>
           </a:p>
@@ -7363,6 +7438,268 @@
           <a:p>
             <a:r>
               <a:rPr lang="en-US" dirty="0" smtClean="0"/>
+              <a:t>Container Computing</a:t>
+            </a:r>
+            <a:endParaRPr lang="en-US" dirty="0"/>
+          </a:p>
+        </p:txBody>
+      </p:sp>
+      <p:sp>
+        <p:nvSpPr>
+          <p:cNvPr id="3" name="Content Placeholder 2"/>
+          <p:cNvSpPr>
+            <a:spLocks noGrp="1"/>
+          </p:cNvSpPr>
+          <p:nvPr>
+            <p:ph idx="1"/>
+          </p:nvPr>
+        </p:nvSpPr>
+        <p:spPr/>
+        <p:txBody>
+          <a:bodyPr>
+            <a:normAutofit fontScale="92500" lnSpcReduction="10000"/>
+          </a:bodyPr>
+          <a:lstStyle/>
+          <a:p>
+            <a:r>
+              <a:rPr lang="en-US" dirty="0" smtClean="0"/>
+              <a:t>Shipping code and runtime environment together</a:t>
+            </a:r>
+          </a:p>
+          <a:p>
+            <a:r>
+              <a:rPr lang="en-US" dirty="0" smtClean="0"/>
+              <a:t>The same image that runs on a workstation is run in production</a:t>
+            </a:r>
+          </a:p>
+          <a:p>
+            <a:pPr lvl="1"/>
+            <a:r>
+              <a:rPr lang="en-US" dirty="0" smtClean="0"/>
+              <a:t>Docker is the primary implementation</a:t>
+            </a:r>
+            <a:endParaRPr lang="en-US" dirty="0" smtClean="0">
+              <a:hlinkClick r:id="rId2"/>
+            </a:endParaRPr>
+          </a:p>
+          <a:p>
+            <a:r>
+              <a:rPr lang="en-US" dirty="0" smtClean="0">
+                <a:hlinkClick r:id="rId2"/>
+              </a:rPr>
+              <a:t>https</a:t>
+            </a:r>
+            <a:r>
+              <a:rPr lang="en-US" dirty="0">
+                <a:hlinkClick r:id="rId2"/>
+              </a:rPr>
+              <a:t>://www.docker.com/</a:t>
+            </a:r>
+          </a:p>
+          <a:p>
+            <a:r>
+              <a:rPr lang="en-US" dirty="0" smtClean="0">
+                <a:hlinkClick r:id="rId2"/>
+              </a:rPr>
+              <a:t>https</a:t>
+            </a:r>
+            <a:r>
+              <a:rPr lang="en-US" dirty="0">
+                <a:hlinkClick r:id="rId2"/>
+              </a:rPr>
+              <a:t>://cloud.google.com/compute/docs/containers</a:t>
+            </a:r>
+          </a:p>
+          <a:p>
+            <a:r>
+              <a:rPr lang="en-US" dirty="0" smtClean="0">
+                <a:hlinkClick r:id="rId2"/>
+              </a:rPr>
+              <a:t>http</a:t>
+            </a:r>
+            <a:r>
+              <a:rPr lang="en-US" dirty="0">
+                <a:hlinkClick r:id="rId2"/>
+              </a:rPr>
+              <a:t>://aws.amazon.com/blogs/aws/container-computing</a:t>
+            </a:r>
+            <a:r>
+              <a:rPr lang="en-US" dirty="0" smtClean="0">
+                <a:hlinkClick r:id="rId2"/>
+              </a:rPr>
+              <a:t>/</a:t>
+            </a:r>
+            <a:r>
+              <a:rPr lang="en-US" dirty="0" smtClean="0"/>
+              <a:t> </a:t>
+            </a:r>
+            <a:endParaRPr lang="en-US" dirty="0"/>
+          </a:p>
+        </p:txBody>
+      </p:sp>
+    </p:spTree>
+    <p:extLst>
+      <p:ext uri="{BB962C8B-B14F-4D97-AF65-F5344CB8AC3E}">
+        <p14:creationId xmlns:p14="http://schemas.microsoft.com/office/powerpoint/2010/main" val="1048973811"/>
+      </p:ext>
+    </p:extLst>
+  </p:cSld>
+  <p:clrMapOvr>
+    <a:masterClrMapping/>
+  </p:clrMapOvr>
+</p:sld>
+</file>
+
+<file path=ppt/slides/slide43.xml><?xml version="1.0" encoding="utf-8"?>
+<p:sld xmlns:a="http://schemas.openxmlformats.org/drawingml/2006/main" xmlns:r="http://schemas.openxmlformats.org/officeDocument/2006/relationships" xmlns:p="http://schemas.openxmlformats.org/presentationml/2006/main">
+  <p:cSld>
+    <p:spTree>
+      <p:nvGrpSpPr>
+        <p:cNvPr id="1" name=""/>
+        <p:cNvGrpSpPr/>
+        <p:nvPr/>
+      </p:nvGrpSpPr>
+      <p:grpSpPr>
+        <a:xfrm>
+          <a:off x="0" y="0"/>
+          <a:ext cx="0" cy="0"/>
+          <a:chOff x="0" y="0"/>
+          <a:chExt cx="0" cy="0"/>
+        </a:xfrm>
+      </p:grpSpPr>
+      <p:sp>
+        <p:nvSpPr>
+          <p:cNvPr id="2" name="Title 1"/>
+          <p:cNvSpPr>
+            <a:spLocks noGrp="1"/>
+          </p:cNvSpPr>
+          <p:nvPr>
+            <p:ph type="title"/>
+          </p:nvPr>
+        </p:nvSpPr>
+        <p:spPr/>
+        <p:txBody>
+          <a:bodyPr/>
+          <a:lstStyle/>
+          <a:p>
+            <a:r>
+              <a:rPr lang="en-US" dirty="0" smtClean="0"/>
+              <a:t>Summary</a:t>
+            </a:r>
+            <a:endParaRPr lang="en-US" dirty="0"/>
+          </a:p>
+        </p:txBody>
+      </p:sp>
+      <p:sp>
+        <p:nvSpPr>
+          <p:cNvPr id="3" name="Content Placeholder 2"/>
+          <p:cNvSpPr>
+            <a:spLocks noGrp="1"/>
+          </p:cNvSpPr>
+          <p:nvPr>
+            <p:ph idx="1"/>
+          </p:nvPr>
+        </p:nvSpPr>
+        <p:spPr>
+          <a:xfrm>
+            <a:off x="457200" y="1417638"/>
+            <a:ext cx="8229600" cy="5133718"/>
+          </a:xfrm>
+        </p:spPr>
+        <p:txBody>
+          <a:bodyPr>
+            <a:normAutofit/>
+          </a:bodyPr>
+          <a:lstStyle/>
+          <a:p>
+            <a:r>
+              <a:rPr lang="en-US" dirty="0" smtClean="0"/>
+              <a:t>Automation is hard work</a:t>
+            </a:r>
+          </a:p>
+          <a:p>
+            <a:pPr lvl="1"/>
+            <a:r>
+              <a:rPr lang="en-US" dirty="0" smtClean="0"/>
+              <a:t>A field unto itself at any scale and distinct from typical software development</a:t>
+            </a:r>
+          </a:p>
+          <a:p>
+            <a:pPr lvl="1"/>
+            <a:r>
+              <a:rPr lang="en-US" dirty="0" smtClean="0"/>
+              <a:t>It changes all the time, like the code it hosts and the infrastructure it relies upon</a:t>
+            </a:r>
+          </a:p>
+          <a:p>
+            <a:r>
+              <a:rPr lang="en-US" dirty="0" smtClean="0"/>
+              <a:t>So much more to think about</a:t>
+            </a:r>
+          </a:p>
+          <a:p>
+            <a:pPr lvl="1"/>
+            <a:r>
+              <a:rPr lang="en-US" dirty="0" smtClean="0"/>
+              <a:t>Monitoring, notification, logging, backup, DR, HA, provisioning, scaling, etc.</a:t>
+            </a:r>
+          </a:p>
+          <a:p>
+            <a:r>
+              <a:rPr lang="en-US" dirty="0" smtClean="0"/>
+              <a:t>It is required to fully take advantage of the benefits of cloud computing</a:t>
+            </a:r>
+            <a:endParaRPr lang="en-US" dirty="0"/>
+          </a:p>
+        </p:txBody>
+      </p:sp>
+    </p:spTree>
+    <p:extLst>
+      <p:ext uri="{BB962C8B-B14F-4D97-AF65-F5344CB8AC3E}">
+        <p14:creationId xmlns:p14="http://schemas.microsoft.com/office/powerpoint/2010/main" val="1324877183"/>
+      </p:ext>
+    </p:extLst>
+  </p:cSld>
+  <p:clrMapOvr>
+    <a:masterClrMapping/>
+  </p:clrMapOvr>
+</p:sld>
+</file>
+
+<file path=ppt/slides/slide44.xml><?xml version="1.0" encoding="utf-8"?>
+<p:sld xmlns:a="http://schemas.openxmlformats.org/drawingml/2006/main" xmlns:r="http://schemas.openxmlformats.org/officeDocument/2006/relationships" xmlns:p="http://schemas.openxmlformats.org/presentationml/2006/main">
+  <p:cSld>
+    <p:spTree>
+      <p:nvGrpSpPr>
+        <p:cNvPr id="1" name=""/>
+        <p:cNvGrpSpPr/>
+        <p:nvPr/>
+      </p:nvGrpSpPr>
+      <p:grpSpPr>
+        <a:xfrm>
+          <a:off x="0" y="0"/>
+          <a:ext cx="0" cy="0"/>
+          <a:chOff x="0" y="0"/>
+          <a:chExt cx="0" cy="0"/>
+        </a:xfrm>
+      </p:grpSpPr>
+      <p:sp>
+        <p:nvSpPr>
+          <p:cNvPr id="2" name="Title 1"/>
+          <p:cNvSpPr>
+            <a:spLocks noGrp="1"/>
+          </p:cNvSpPr>
+          <p:nvPr>
+            <p:ph type="title"/>
+          </p:nvPr>
+        </p:nvSpPr>
+        <p:spPr/>
+        <p:txBody>
+          <a:bodyPr/>
+          <a:lstStyle/>
+          <a:p>
+            <a:r>
+              <a:rPr lang="en-US" dirty="0" smtClean="0"/>
               <a:t>Questions?</a:t>
             </a:r>
             <a:endParaRPr lang="en-US" dirty="0"/>
@@ -7381,7 +7718,9 @@
         </p:nvSpPr>
         <p:spPr/>
         <p:txBody>
-          <a:bodyPr/>
+          <a:bodyPr>
+            <a:normAutofit lnSpcReduction="10000"/>
+          </a:bodyPr>
           <a:lstStyle/>
           <a:p>
             <a:r>
@@ -7428,6 +7767,65 @@
               <a:t>http://aws.amazon.com/documentation/</a:t>
             </a:r>
             <a:endParaRPr lang="en-US" dirty="0" smtClean="0"/>
+          </a:p>
+          <a:p>
+            <a:pPr lvl="1"/>
+            <a:r>
+              <a:rPr lang="en-US" dirty="0">
+                <a:hlinkClick r:id="rId3"/>
+              </a:rPr>
+              <a:t>https://boto.readthedocs.org/en/latest</a:t>
+            </a:r>
+            <a:r>
+              <a:rPr lang="en-US" dirty="0" smtClean="0">
+                <a:hlinkClick r:id="rId3"/>
+              </a:rPr>
+              <a:t>/</a:t>
+            </a:r>
+            <a:r>
+              <a:rPr lang="en-US" dirty="0" smtClean="0"/>
+              <a:t> </a:t>
+            </a:r>
+            <a:endParaRPr lang="en-US" dirty="0" smtClean="0"/>
+          </a:p>
+          <a:p>
+            <a:pPr lvl="1"/>
+            <a:r>
+              <a:rPr lang="en-US" dirty="0">
+                <a:hlinkClick r:id="rId4"/>
+              </a:rPr>
+              <a:t>http://serverspec.org</a:t>
+            </a:r>
+            <a:r>
+              <a:rPr lang="en-US" dirty="0" smtClean="0">
+                <a:hlinkClick r:id="rId4"/>
+              </a:rPr>
+              <a:t>/</a:t>
+            </a:r>
+            <a:r>
+              <a:rPr lang="en-US" dirty="0" smtClean="0"/>
+              <a:t> </a:t>
+            </a:r>
+            <a:endParaRPr lang="en-US" dirty="0" smtClean="0"/>
+          </a:p>
+          <a:p>
+            <a:pPr lvl="1"/>
+            <a:r>
+              <a:rPr lang="en-US" dirty="0">
+                <a:hlinkClick r:id="rId5"/>
+              </a:rPr>
+              <a:t>http://techblog.netflix.com</a:t>
+            </a:r>
+            <a:r>
+              <a:rPr lang="en-US" dirty="0" smtClean="0">
+                <a:hlinkClick r:id="rId5"/>
+              </a:rPr>
+              <a:t>/</a:t>
+            </a:r>
+            <a:r>
+              <a:rPr lang="en-US" dirty="0" smtClean="0"/>
+              <a:t> </a:t>
+            </a:r>
           </a:p>
           <a:p>
             <a:endParaRPr lang="en-US" dirty="0"/>
@@ -7499,8 +7897,8 @@
         </p:nvSpPr>
         <p:spPr>
           <a:xfrm>
-            <a:off x="457200" y="1600200"/>
-            <a:ext cx="8229600" cy="4893435"/>
+            <a:off x="457200" y="1417638"/>
+            <a:ext cx="8229600" cy="5075997"/>
           </a:xfrm>
         </p:spPr>
         <p:txBody>
@@ -7549,7 +7947,15 @@
             <a:pPr lvl="1"/>
             <a:r>
               <a:rPr lang="en-US" dirty="0" smtClean="0"/>
-              <a:t>Provisioned by code written by developer team</a:t>
+              <a:t>Provisioned by code written by developers (either the core team or </a:t>
+            </a:r>
+            <a:r>
+              <a:rPr lang="en-US" dirty="0" err="1" smtClean="0"/>
+              <a:t>DevOps</a:t>
+            </a:r>
+            <a:r>
+              <a:rPr lang="en-US" dirty="0" smtClean="0"/>
+              <a:t> types)</a:t>
             </a:r>
           </a:p>
           <a:p>
@@ -7768,13 +8174,13 @@
         </p:nvSpPr>
         <p:spPr>
           <a:xfrm>
-            <a:off x="457200" y="1226576"/>
-            <a:ext cx="8229600" cy="4899588"/>
+            <a:off x="457200" y="1226575"/>
+            <a:ext cx="8229600" cy="5454653"/>
           </a:xfrm>
         </p:spPr>
         <p:txBody>
           <a:bodyPr>
-            <a:normAutofit lnSpcReduction="10000"/>
+            <a:normAutofit/>
           </a:bodyPr>
           <a:lstStyle/>
           <a:p>
@@ -7840,7 +8246,7 @@
         </p:blipFill>
         <p:spPr>
           <a:xfrm>
-            <a:off x="2032000" y="1111134"/>
+            <a:off x="2032000" y="1226575"/>
             <a:ext cx="4707393" cy="3943412"/>
           </a:xfrm>
           <a:prstGeom prst="rect">
@@ -7971,9 +8377,16 @@
             <p:ph idx="1"/>
           </p:nvPr>
         </p:nvSpPr>
-        <p:spPr/>
-        <p:txBody>
-          <a:bodyPr/>
+        <p:spPr>
+          <a:xfrm>
+            <a:off x="457200" y="1600200"/>
+            <a:ext cx="8229600" cy="4777993"/>
+          </a:xfrm>
+        </p:spPr>
+        <p:txBody>
+          <a:bodyPr>
+            <a:normAutofit lnSpcReduction="10000"/>
+          </a:bodyPr>
           <a:lstStyle/>
           <a:p>
             <a:r>
@@ -7994,6 +8407,25 @@
             <a:r>
               <a:rPr lang="en-US" dirty="0" smtClean="0"/>
               <a:t>EC2 (and other cloud providers) provide ways to launch commands upon boot</a:t>
+            </a:r>
+          </a:p>
+          <a:p>
+            <a:pPr lvl="1"/>
+            <a:r>
+              <a:rPr lang="en-US" dirty="0"/>
+              <a:t>b</a:t>
+            </a:r>
+            <a:r>
+              <a:rPr lang="en-US" dirty="0" smtClean="0"/>
+              <a:t>ash scripts and cloud-</a:t>
+            </a:r>
+            <a:r>
+              <a:rPr lang="en-US" dirty="0" err="1" smtClean="0"/>
+              <a:t>init</a:t>
+            </a:r>
+            <a:r>
+              <a:rPr lang="en-US" dirty="0" smtClean="0"/>
+              <a:t> are typical</a:t>
             </a:r>
           </a:p>
           <a:p>

</xml_diff>